<commit_message>
Revised Assessment 3 Presentation
</commit_message>
<xml_diff>
--- a/Presentation Assessment 3.pptx
+++ b/Presentation Assessment 3.pptx
@@ -3866,7 +3866,12 @@
             <p:ph idx="1"/>
           </p:nvPr>
         </p:nvSpPr>
-        <p:spPr/>
+        <p:spPr>
+          <a:xfrm>
+            <a:off x="838200" y="1463040"/>
+            <a:ext cx="10515600" cy="5029835"/>
+          </a:xfrm>
+        </p:spPr>
         <p:txBody>
           <a:bodyPr>
             <a:normAutofit fontScale="77500" lnSpcReduction="20000"/>
@@ -3875,13 +3880,29 @@
           <a:p>
             <a:r>
               <a:rPr lang="en-AU" dirty="0"/>
-              <a:t>The final Project Proposal has been written and all supporting documentation prepared. All this documentation will be submitted in a zipped file as part of this  assessment</a:t>
+              <a:t>The final Project Proposal has been written and all supporting documentation prepared. This documentation will be submitted in a zipped file as part of this  assessment.</a:t>
             </a:r>
           </a:p>
           <a:p>
             <a:r>
               <a:rPr lang="en-AU" dirty="0"/>
-              <a:t>Very little is known of the target company’s infrastructure other than a basic device count and the fact that a company website exists. This has meant that I have, if anything, overestimated the duration of tasks involving an onsite presence. There may yet be a few surprises in store which may cause the project duration to blow out.</a:t>
+              <a:t>Version control has been implemented in Sublime Merge and the repository pushed to GitHub. This repository is public and can be found at </a:t>
+            </a:r>
+            <a:r>
+              <a:rPr lang="en-AU" dirty="0">
+                <a:hlinkClick r:id="rId2"/>
+              </a:rPr>
+              <a:t>https://github.com/Csappleb-ECU/Cyber-Project---1.git</a:t>
+            </a:r>
+            <a:r>
+              <a:rPr lang="en-AU" dirty="0"/>
+              <a:t>. A pdf pf the commit history is included.</a:t>
+            </a:r>
+          </a:p>
+          <a:p>
+            <a:r>
+              <a:rPr lang="en-AU" dirty="0"/>
+              <a:t>Very little is known of the target company’s infrastructure other than a basic device count and the fact that a company website exists. This has meant that I have, if anything, deliberately overestimated the duration of some tasks. There may yet be a few surprises in store which may cause the some task durations to blow out.</a:t>
             </a:r>
           </a:p>
           <a:p>
@@ -3901,17 +3922,14 @@
           <a:p>
             <a:r>
               <a:rPr lang="en-AU" dirty="0"/>
-              <a:t>As commented earlier, given the lack of known detail,  task durations have been estimated at the upper end of the possible range to allow for “surprises”.</a:t>
+              <a:t>As commented earlier, given the lack of detail known,  task durations have been estimated at the upper end of the possible range to allow for “surprises”.</a:t>
             </a:r>
           </a:p>
           <a:p>
             <a:r>
               <a:rPr lang="en-AU" dirty="0"/>
-              <a:t>A proposed agreement between the company and myself has been drafted. This draft, which is in its early stages needs to be revised to a final form which can be presented to the target company for signing. The agreement needs to include suitable times for onsite presence and any applicable terms and conditions.</a:t>
-            </a:r>
-          </a:p>
-          <a:p>
-            <a:endParaRPr lang="en-AU" dirty="0"/>
+              <a:t>A proposed agreement between the company and myself has been drafted. This draft, which is in its early stages needs to be revised to a final form for signing by the target company. </a:t>
+            </a:r>
           </a:p>
           <a:p>
             <a:endParaRPr lang="en-AU" dirty="0"/>
@@ -3999,14 +4017,19 @@
         <p:spPr/>
         <p:txBody>
           <a:bodyPr>
-            <a:normAutofit fontScale="85000" lnSpcReduction="20000"/>
+            <a:normAutofit fontScale="77500" lnSpcReduction="20000"/>
           </a:bodyPr>
           <a:lstStyle/>
           <a:p>
             <a:r>
               <a:rPr lang="en-AU" dirty="0"/>
-              <a:t>Firstly I need to revise and bring to its final form, the text of the proposed agreement.</a:t>
-            </a:r>
+              <a:t>Firstly I need to revise and bring to its final form, the text of the proposed agreement. </a:t>
+            </a:r>
+            <a:r>
+              <a:rPr lang="en-AU"/>
+              <a:t>The agreement needs to include suitable times for onsite presence and any applicable terms and conditions.</a:t>
+            </a:r>
+            <a:endParaRPr lang="en-AU" dirty="0"/>
           </a:p>
           <a:p>
             <a:r>

</xml_diff>

<commit_message>
Further revisions to Assessment 3 Presentation
</commit_message>
<xml_diff>
--- a/Presentation Assessment 3.pptx
+++ b/Presentation Assessment 3.pptx
@@ -3845,7 +3845,7 @@
                 <a:latin typeface="Alef" panose="00000500000000000000" pitchFamily="2" charset="-79"/>
                 <a:cs typeface="Alef" panose="00000500000000000000" pitchFamily="2" charset="-79"/>
               </a:rPr>
-              <a:t>What is the Current Status of the Project</a:t>
+              <a:t>What is the Current Status of Project</a:t>
             </a:r>
           </a:p>
         </p:txBody>
@@ -3868,66 +3868,125 @@
         </p:nvSpPr>
         <p:spPr>
           <a:xfrm>
-            <a:off x="838200" y="1463040"/>
-            <a:ext cx="10515600" cy="5029835"/>
+            <a:off x="838200" y="1515291"/>
+            <a:ext cx="10515600" cy="4977584"/>
           </a:xfrm>
         </p:spPr>
         <p:txBody>
           <a:bodyPr>
-            <a:normAutofit fontScale="77500" lnSpcReduction="20000"/>
+            <a:normAutofit fontScale="70000" lnSpcReduction="20000"/>
           </a:bodyPr>
           <a:lstStyle/>
           <a:p>
-            <a:r>
-              <a:rPr lang="en-AU" dirty="0"/>
+            <a:pPr>
+              <a:spcBef>
+                <a:spcPts val="1800"/>
+              </a:spcBef>
+            </a:pPr>
+            <a:r>
+              <a:rPr lang="en-AU" dirty="0">
+                <a:latin typeface="Arial" panose="020B0604020202020204" pitchFamily="34" charset="0"/>
+                <a:cs typeface="Arial" panose="020B0604020202020204" pitchFamily="34" charset="0"/>
+              </a:rPr>
               <a:t>The final Project Proposal has been written and all supporting documentation prepared. This documentation will be submitted in a zipped file as part of this  assessment.</a:t>
             </a:r>
           </a:p>
           <a:p>
-            <a:r>
-              <a:rPr lang="en-AU" dirty="0"/>
+            <a:pPr>
+              <a:spcBef>
+                <a:spcPts val="1800"/>
+              </a:spcBef>
+            </a:pPr>
+            <a:r>
+              <a:rPr lang="en-AU" dirty="0">
+                <a:latin typeface="Arial" panose="020B0604020202020204" pitchFamily="34" charset="0"/>
+                <a:cs typeface="Arial" panose="020B0604020202020204" pitchFamily="34" charset="0"/>
+              </a:rPr>
               <a:t>Version control has been implemented in Sublime Merge and the repository pushed to GitHub. This repository is public and can be found at </a:t>
             </a:r>
             <a:r>
               <a:rPr lang="en-AU" dirty="0">
+                <a:latin typeface="Arial" panose="020B0604020202020204" pitchFamily="34" charset="0"/>
+                <a:cs typeface="Arial" panose="020B0604020202020204" pitchFamily="34" charset="0"/>
                 <a:hlinkClick r:id="rId2"/>
               </a:rPr>
               <a:t>https://github.com/Csappleb-ECU/Cyber-Project---1.git</a:t>
             </a:r>
             <a:r>
-              <a:rPr lang="en-AU" dirty="0"/>
-              <a:t>. A pdf pf the commit history is included.</a:t>
-            </a:r>
-          </a:p>
-          <a:p>
-            <a:r>
-              <a:rPr lang="en-AU" dirty="0"/>
+              <a:rPr lang="en-AU" dirty="0">
+                <a:latin typeface="Arial" panose="020B0604020202020204" pitchFamily="34" charset="0"/>
+                <a:cs typeface="Arial" panose="020B0604020202020204" pitchFamily="34" charset="0"/>
+              </a:rPr>
+              <a:t>. A pdf pf the commit history is included in the zip file.</a:t>
+            </a:r>
+          </a:p>
+          <a:p>
+            <a:pPr>
+              <a:spcBef>
+                <a:spcPts val="1800"/>
+              </a:spcBef>
+            </a:pPr>
+            <a:r>
+              <a:rPr lang="en-AU" dirty="0">
+                <a:latin typeface="Arial" panose="020B0604020202020204" pitchFamily="34" charset="0"/>
+                <a:cs typeface="Arial" panose="020B0604020202020204" pitchFamily="34" charset="0"/>
+              </a:rPr>
               <a:t>Very little is known of the target company’s infrastructure other than a basic device count and the fact that a company website exists. This has meant that I have, if anything, deliberately overestimated the duration of some tasks. There may yet be a few surprises in store which may cause the some task durations to blow out.</a:t>
             </a:r>
           </a:p>
           <a:p>
-            <a:r>
-              <a:rPr lang="en-AU" dirty="0"/>
-              <a:t>A Gantt chart showing the tasks to be undertaken and their links has been prepared and a baseline recorded. This has been provided both as an MS Project (</a:t>
-            </a:r>
-            <a:r>
-              <a:rPr lang="en-AU" dirty="0" err="1"/>
+            <a:pPr>
+              <a:spcBef>
+                <a:spcPts val="1800"/>
+              </a:spcBef>
+            </a:pPr>
+            <a:r>
+              <a:rPr lang="en-AU" dirty="0">
+                <a:latin typeface="Arial" panose="020B0604020202020204" pitchFamily="34" charset="0"/>
+                <a:cs typeface="Arial" panose="020B0604020202020204" pitchFamily="34" charset="0"/>
+              </a:rPr>
+              <a:t>A Gantt chart showing the tasks to be undertaken and their relationships has been prepared and a baseline recorded. This has been provided both as an MS Project (</a:t>
+            </a:r>
+            <a:r>
+              <a:rPr lang="en-AU" dirty="0" err="1">
+                <a:latin typeface="Arial" panose="020B0604020202020204" pitchFamily="34" charset="0"/>
+                <a:cs typeface="Arial" panose="020B0604020202020204" pitchFamily="34" charset="0"/>
+              </a:rPr>
               <a:t>mpp</a:t>
             </a:r>
             <a:r>
-              <a:rPr lang="en-AU" dirty="0"/>
+              <a:rPr lang="en-AU" dirty="0">
+                <a:latin typeface="Arial" panose="020B0604020202020204" pitchFamily="34" charset="0"/>
+                <a:cs typeface="Arial" panose="020B0604020202020204" pitchFamily="34" charset="0"/>
+              </a:rPr>
               <a:t>) file and a Word Document displaying a screen snapshot.</a:t>
             </a:r>
           </a:p>
           <a:p>
-            <a:r>
-              <a:rPr lang="en-AU" dirty="0"/>
+            <a:pPr>
+              <a:spcBef>
+                <a:spcPts val="1800"/>
+              </a:spcBef>
+            </a:pPr>
+            <a:r>
+              <a:rPr lang="en-AU" dirty="0">
+                <a:latin typeface="Arial" panose="020B0604020202020204" pitchFamily="34" charset="0"/>
+                <a:cs typeface="Arial" panose="020B0604020202020204" pitchFamily="34" charset="0"/>
+              </a:rPr>
               <a:t>As commented earlier, given the lack of detail known,  task durations have been estimated at the upper end of the possible range to allow for “surprises”.</a:t>
             </a:r>
           </a:p>
           <a:p>
-            <a:r>
-              <a:rPr lang="en-AU" dirty="0"/>
+            <a:pPr>
+              <a:spcBef>
+                <a:spcPts val="1800"/>
+              </a:spcBef>
+            </a:pPr>
+            <a:r>
+              <a:rPr lang="en-AU" dirty="0">
+                <a:latin typeface="Arial" panose="020B0604020202020204" pitchFamily="34" charset="0"/>
+                <a:cs typeface="Arial" panose="020B0604020202020204" pitchFamily="34" charset="0"/>
+              </a:rPr>
               <a:t>A proposed agreement between the company and myself has been drafted. This draft, which is in its early stages needs to be revised to a final form for signing by the target company. </a:t>
             </a:r>
           </a:p>
@@ -4014,51 +4073,127 @@
             <p:ph idx="1"/>
           </p:nvPr>
         </p:nvSpPr>
-        <p:spPr/>
+        <p:spPr>
+          <a:xfrm>
+            <a:off x="838200" y="1532708"/>
+            <a:ext cx="10515600" cy="4841965"/>
+          </a:xfrm>
+        </p:spPr>
         <p:txBody>
           <a:bodyPr>
-            <a:normAutofit fontScale="77500" lnSpcReduction="20000"/>
+            <a:noAutofit/>
           </a:bodyPr>
           <a:lstStyle/>
           <a:p>
-            <a:r>
-              <a:rPr lang="en-AU" dirty="0"/>
-              <a:t>Firstly I need to revise and bring to its final form, the text of the proposed agreement. </a:t>
-            </a:r>
-            <a:r>
-              <a:rPr lang="en-AU"/>
-              <a:t>The agreement needs to include suitable times for onsite presence and any applicable terms and conditions.</a:t>
-            </a:r>
-            <a:endParaRPr lang="en-AU" dirty="0"/>
-          </a:p>
-          <a:p>
-            <a:r>
-              <a:rPr lang="en-AU" dirty="0"/>
-              <a:t>Then a signature must be obtained for that agreement. This must be done before the project commences.</a:t>
-            </a:r>
-          </a:p>
-          <a:p>
-            <a:r>
-              <a:rPr lang="en-AU" dirty="0"/>
-              <a:t>Once we have agreement, I can then commence the detailed risk assessment, documenting the process fully throughout while complying with any terms in the agreement.</a:t>
-            </a:r>
-          </a:p>
-          <a:p>
-            <a:r>
-              <a:rPr lang="en-AU" dirty="0"/>
+            <a:pPr>
+              <a:spcBef>
+                <a:spcPts val="800"/>
+              </a:spcBef>
+            </a:pPr>
+            <a:r>
+              <a:rPr lang="en-AU" sz="2000" dirty="0">
+                <a:latin typeface="Arial" panose="020B0604020202020204" pitchFamily="34" charset="0"/>
+                <a:cs typeface="Arial" panose="020B0604020202020204" pitchFamily="34" charset="0"/>
+              </a:rPr>
+              <a:t>Firstly I need to revise and bring to its final form, the text of the proposed agreement. The agreement needs to include suitable times for onsite presence and any applicable terms and conditions.</a:t>
+            </a:r>
+          </a:p>
+          <a:p>
+            <a:pPr>
+              <a:spcBef>
+                <a:spcPts val="800"/>
+              </a:spcBef>
+            </a:pPr>
+            <a:r>
+              <a:rPr lang="en-AU" sz="2000" dirty="0">
+                <a:latin typeface="Arial" panose="020B0604020202020204" pitchFamily="34" charset="0"/>
+                <a:cs typeface="Arial" panose="020B0604020202020204" pitchFamily="34" charset="0"/>
+              </a:rPr>
+              <a:t>Then a signature must be obtained for that agreement. This </a:t>
+            </a:r>
+            <a:r>
+              <a:rPr lang="en-AU" sz="2000" b="1" dirty="0">
+                <a:latin typeface="Arial" panose="020B0604020202020204" pitchFamily="34" charset="0"/>
+                <a:cs typeface="Arial" panose="020B0604020202020204" pitchFamily="34" charset="0"/>
+              </a:rPr>
+              <a:t>MUST</a:t>
+            </a:r>
+            <a:r>
+              <a:rPr lang="en-AU" sz="2000" dirty="0">
+                <a:latin typeface="Arial" panose="020B0604020202020204" pitchFamily="34" charset="0"/>
+                <a:cs typeface="Arial" panose="020B0604020202020204" pitchFamily="34" charset="0"/>
+              </a:rPr>
+              <a:t> be done before the project commences.</a:t>
+            </a:r>
+          </a:p>
+          <a:p>
+            <a:pPr>
+              <a:spcBef>
+                <a:spcPts val="800"/>
+              </a:spcBef>
+            </a:pPr>
+            <a:r>
+              <a:rPr lang="en-AU" sz="2000" dirty="0">
+                <a:latin typeface="Arial" panose="020B0604020202020204" pitchFamily="34" charset="0"/>
+                <a:cs typeface="Arial" panose="020B0604020202020204" pitchFamily="34" charset="0"/>
+              </a:rPr>
+              <a:t>Once we have agreement, I can then commence the detailed risk assessment, fully documenting the process while complying with any terms in the agreement.</a:t>
+            </a:r>
+          </a:p>
+          <a:p>
+            <a:pPr>
+              <a:spcBef>
+                <a:spcPts val="800"/>
+              </a:spcBef>
+            </a:pPr>
+            <a:r>
+              <a:rPr lang="en-AU" sz="2000" dirty="0">
+                <a:latin typeface="Arial" panose="020B0604020202020204" pitchFamily="34" charset="0"/>
+                <a:cs typeface="Arial" panose="020B0604020202020204" pitchFamily="34" charset="0"/>
+              </a:rPr>
               <a:t>I need to monitor actual vs planned project durations on a regular basis and update the project plan as required.</a:t>
             </a:r>
           </a:p>
           <a:p>
-            <a:r>
-              <a:rPr lang="en-AU" dirty="0"/>
+            <a:pPr>
+              <a:spcBef>
+                <a:spcPts val="800"/>
+              </a:spcBef>
+            </a:pPr>
+            <a:r>
+              <a:rPr lang="en-AU" sz="2000" dirty="0">
+                <a:latin typeface="Arial" panose="020B0604020202020204" pitchFamily="34" charset="0"/>
+                <a:cs typeface="Arial" panose="020B0604020202020204" pitchFamily="34" charset="0"/>
+              </a:rPr>
               <a:t>Once enough of the risk assessment task has been undertaken (I am estimating 2 weeks after commencement) I will be able to commence analysis of the risk assessment data obtained to date.</a:t>
             </a:r>
           </a:p>
           <a:p>
-            <a:r>
-              <a:rPr lang="en-AU" dirty="0"/>
-              <a:t>Completion of the project will then be undertaken in the most efficient and time effective manner possible.</a:t>
+            <a:pPr>
+              <a:spcBef>
+                <a:spcPts val="800"/>
+              </a:spcBef>
+            </a:pPr>
+            <a:r>
+              <a:rPr lang="en-AU" sz="2000" dirty="0">
+                <a:latin typeface="Arial" panose="020B0604020202020204" pitchFamily="34" charset="0"/>
+                <a:cs typeface="Arial" panose="020B0604020202020204" pitchFamily="34" charset="0"/>
+              </a:rPr>
+              <a:t>It then only remains to complete the remainder of the project in the </a:t>
+            </a:r>
+            <a:r>
+              <a:rPr lang="en-AU" sz="2000">
+                <a:latin typeface="Arial" panose="020B0604020202020204" pitchFamily="34" charset="0"/>
+                <a:cs typeface="Arial" panose="020B0604020202020204" pitchFamily="34" charset="0"/>
+              </a:rPr>
+              <a:t>most efficient and </a:t>
+            </a:r>
+            <a:r>
+              <a:rPr lang="en-AU" sz="2000" dirty="0">
+                <a:latin typeface="Arial" panose="020B0604020202020204" pitchFamily="34" charset="0"/>
+                <a:cs typeface="Arial" panose="020B0604020202020204" pitchFamily="34" charset="0"/>
+              </a:rPr>
+              <a:t>time effective manner possible.</a:t>
             </a:r>
           </a:p>
         </p:txBody>

</xml_diff>

<commit_message>
Even more revisions to Assessment 3 Presentations
</commit_message>
<xml_diff>
--- a/Presentation Assessment 3.pptx
+++ b/Presentation Assessment 3.pptx
@@ -3917,7 +3917,7 @@
                 <a:latin typeface="Arial" panose="020B0604020202020204" pitchFamily="34" charset="0"/>
                 <a:cs typeface="Arial" panose="020B0604020202020204" pitchFamily="34" charset="0"/>
               </a:rPr>
-              <a:t>. A pdf pf the commit history is included in the zip file.</a:t>
+              <a:t>. A pdf of the commit history is included in the zip file.</a:t>
             </a:r>
           </a:p>
           <a:p>
@@ -4179,21 +4179,7 @@
                 <a:latin typeface="Arial" panose="020B0604020202020204" pitchFamily="34" charset="0"/>
                 <a:cs typeface="Arial" panose="020B0604020202020204" pitchFamily="34" charset="0"/>
               </a:rPr>
-              <a:t>It then only remains to complete the remainder of the project in the </a:t>
-            </a:r>
-            <a:r>
-              <a:rPr lang="en-AU" sz="2000">
-                <a:latin typeface="Arial" panose="020B0604020202020204" pitchFamily="34" charset="0"/>
-                <a:cs typeface="Arial" panose="020B0604020202020204" pitchFamily="34" charset="0"/>
-              </a:rPr>
-              <a:t>most efficient and </a:t>
-            </a:r>
-            <a:r>
-              <a:rPr lang="en-AU" sz="2000" dirty="0">
-                <a:latin typeface="Arial" panose="020B0604020202020204" pitchFamily="34" charset="0"/>
-                <a:cs typeface="Arial" panose="020B0604020202020204" pitchFamily="34" charset="0"/>
-              </a:rPr>
-              <a:t>time effective manner possible.</a:t>
+              <a:t>It then only remains to complete the remainder of the project in the most efficient and time effective manner possible.</a:t>
             </a:r>
           </a:p>
         </p:txBody>

</xml_diff>

<commit_message>
Change project to task
</commit_message>
<xml_diff>
--- a/Presentation Assessment 3.pptx
+++ b/Presentation Assessment 3.pptx
@@ -4151,7 +4151,21 @@
                 <a:latin typeface="Arial" panose="020B0604020202020204" pitchFamily="34" charset="0"/>
                 <a:cs typeface="Arial" panose="020B0604020202020204" pitchFamily="34" charset="0"/>
               </a:rPr>
-              <a:t>I need to monitor actual vs planned project durations on a regular basis and update the project plan as required.</a:t>
+              <a:t>I need to monitor actual vs </a:t>
+            </a:r>
+            <a:r>
+              <a:rPr lang="en-AU" sz="2000">
+                <a:latin typeface="Arial" panose="020B0604020202020204" pitchFamily="34" charset="0"/>
+                <a:cs typeface="Arial" panose="020B0604020202020204" pitchFamily="34" charset="0"/>
+              </a:rPr>
+              <a:t>planned task </a:t>
+            </a:r>
+            <a:r>
+              <a:rPr lang="en-AU" sz="2000" dirty="0">
+                <a:latin typeface="Arial" panose="020B0604020202020204" pitchFamily="34" charset="0"/>
+                <a:cs typeface="Arial" panose="020B0604020202020204" pitchFamily="34" charset="0"/>
+              </a:rPr>
+              <a:t>durations on a regular basis and update the project plan as required.</a:t>
             </a:r>
           </a:p>
           <a:p>

</xml_diff>

<commit_message>
Minor textual changes to presentation
</commit_message>
<xml_diff>
--- a/Presentation Assessment 3.pptx
+++ b/Presentation Assessment 3.pptx
@@ -3931,7 +3931,7 @@
                 <a:latin typeface="Arial" panose="020B0604020202020204" pitchFamily="34" charset="0"/>
                 <a:cs typeface="Arial" panose="020B0604020202020204" pitchFamily="34" charset="0"/>
               </a:rPr>
-              <a:t>Very little is known of the target company’s infrastructure other than a basic device count and the fact that a company website exists. This has meant that I have, if anything, deliberately overestimated the duration of some tasks. There may yet be a few surprises in store which may cause the some task durations to blow out.</a:t>
+              <a:t>Very little is known of the target company’s infrastructure other than a basic device count and the fact that a company website exists. This has meant that I have, if anything, deliberately overestimated the duration of some tasks. There may yet be a few surprises in store which may cause some task durations to blow out.</a:t>
             </a:r>
           </a:p>
           <a:p>
@@ -4151,21 +4151,7 @@
                 <a:latin typeface="Arial" panose="020B0604020202020204" pitchFamily="34" charset="0"/>
                 <a:cs typeface="Arial" panose="020B0604020202020204" pitchFamily="34" charset="0"/>
               </a:rPr>
-              <a:t>I need to monitor actual vs </a:t>
-            </a:r>
-            <a:r>
-              <a:rPr lang="en-AU" sz="2000">
-                <a:latin typeface="Arial" panose="020B0604020202020204" pitchFamily="34" charset="0"/>
-                <a:cs typeface="Arial" panose="020B0604020202020204" pitchFamily="34" charset="0"/>
-              </a:rPr>
-              <a:t>planned task </a:t>
-            </a:r>
-            <a:r>
-              <a:rPr lang="en-AU" sz="2000" dirty="0">
-                <a:latin typeface="Arial" panose="020B0604020202020204" pitchFamily="34" charset="0"/>
-                <a:cs typeface="Arial" panose="020B0604020202020204" pitchFamily="34" charset="0"/>
-              </a:rPr>
-              <a:t>durations on a regular basis and update the project plan as required.</a:t>
+              <a:t>I need to monitor actual vs planned task durations on a regular basis and update the project plan as required.</a:t>
             </a:r>
           </a:p>
           <a:p>

</xml_diff>